<commit_message>
Reworked mid term presentation
</commit_message>
<xml_diff>
--- a/presentation/intermediate_pres.pptx
+++ b/presentation/intermediate_pres.pptx
@@ -5,7 +5,7 @@
     <p:sldMasterId id="2147483714" r:id="rId1"/>
   </p:sldMasterIdLst>
   <p:notesMasterIdLst>
-    <p:notesMasterId r:id="rId9"/>
+    <p:notesMasterId r:id="rId10"/>
   </p:notesMasterIdLst>
   <p:sldIdLst>
     <p:sldId id="256" r:id="rId2"/>
@@ -15,6 +15,7 @@
     <p:sldId id="259" r:id="rId6"/>
     <p:sldId id="260" r:id="rId7"/>
     <p:sldId id="261" r:id="rId8"/>
+    <p:sldId id="263" r:id="rId9"/>
   </p:sldIdLst>
   <p:sldSz cx="12192000" cy="6858000"/>
   <p:notesSz cx="6858000" cy="9144000"/>
@@ -4411,7 +4412,7 @@
         </p:nvSpPr>
         <p:spPr>
           <a:xfrm>
-            <a:off x="1648418" y="5341034"/>
+            <a:off x="1648418" y="5664200"/>
             <a:ext cx="6656439" cy="646331"/>
           </a:xfrm>
           <a:prstGeom prst="rect">
@@ -4475,6 +4476,7 @@
       <p:bgPr>
         <a:blipFill dpi="0" rotWithShape="1">
           <a:blip r:embed="rId2">
+            <a:alphaModFix amt="65000"/>
             <a:lum/>
           </a:blip>
           <a:srcRect/>
@@ -4515,7 +4517,12 @@
             <p:ph type="title"/>
           </p:nvPr>
         </p:nvSpPr>
-        <p:spPr/>
+        <p:spPr>
+          <a:xfrm>
+            <a:off x="1371600" y="685800"/>
+            <a:ext cx="9601200" cy="789039"/>
+          </a:xfrm>
+        </p:spPr>
         <p:txBody>
           <a:bodyPr/>
           <a:lstStyle/>
@@ -4527,14 +4534,6 @@
             <a:r>
               <a:rPr lang="it-IT" dirty="0" err="1"/>
               <a:t>context</a:t>
-            </a:r>
-            <a:r>
-              <a:rPr lang="it-IT" dirty="0"/>
-              <a:t> – clear </a:t>
-            </a:r>
-            <a:r>
-              <a:rPr lang="it-IT" dirty="0" err="1"/>
-              <a:t>requirements</a:t>
             </a:r>
             <a:endParaRPr lang="it-IT" dirty="0"/>
           </a:p>
@@ -4556,10 +4555,15 @@
             <p:ph idx="1"/>
           </p:nvPr>
         </p:nvSpPr>
-        <p:spPr/>
+        <p:spPr>
+          <a:xfrm>
+            <a:off x="1371600" y="1474839"/>
+            <a:ext cx="9601200" cy="3581400"/>
+          </a:xfrm>
+        </p:spPr>
         <p:txBody>
           <a:bodyPr>
-            <a:normAutofit fontScale="92500" lnSpcReduction="10000"/>
+            <a:normAutofit/>
           </a:bodyPr>
           <a:lstStyle/>
           <a:p>
@@ -4632,63 +4636,322 @@
           <a:p>
             <a:endParaRPr lang="it-IT" dirty="0"/>
           </a:p>
-          <a:p>
+        </p:txBody>
+      </p:sp>
+      <p:sp>
+        <p:nvSpPr>
+          <p:cNvPr id="4" name="Titolo 1">
+            <a:extLst>
+              <a:ext uri="{FF2B5EF4-FFF2-40B4-BE49-F238E27FC236}">
+                <a16:creationId xmlns:a16="http://schemas.microsoft.com/office/drawing/2014/main" id="{5DF39EE3-0C8A-0BA4-CBA8-2F9EE74A0893}"/>
+              </a:ext>
+            </a:extLst>
+          </p:cNvPr>
+          <p:cNvSpPr txBox="1">
+            <a:spLocks/>
+          </p:cNvSpPr>
+          <p:nvPr/>
+        </p:nvSpPr>
+        <p:spPr>
+          <a:xfrm>
+            <a:off x="1371600" y="3265364"/>
+            <a:ext cx="9601200" cy="1485900"/>
+          </a:xfrm>
+          <a:prstGeom prst="rect">
+            <a:avLst/>
+          </a:prstGeom>
+        </p:spPr>
+        <p:txBody>
+          <a:bodyPr vert="horz" lIns="91440" tIns="45720" rIns="91440" bIns="45720" rtlCol="0" anchor="t">
+            <a:normAutofit/>
+          </a:bodyPr>
+          <a:lstStyle>
+            <a:lvl1pPr algn="l" defTabSz="914400" rtl="0" eaLnBrk="1" latinLnBrk="0" hangingPunct="1">
+              <a:lnSpc>
+                <a:spcPct val="89000"/>
+              </a:lnSpc>
+              <a:spcBef>
+                <a:spcPct val="0"/>
+              </a:spcBef>
+              <a:buNone/>
+              <a:defRPr sz="4400" kern="1200" baseline="0">
+                <a:solidFill>
+                  <a:schemeClr val="tx2"/>
+                </a:solidFill>
+                <a:latin typeface="+mj-lt"/>
+                <a:ea typeface="+mj-ea"/>
+                <a:cs typeface="+mj-cs"/>
+              </a:defRPr>
+            </a:lvl1pPr>
+          </a:lstStyle>
+          <a:p>
+            <a:pPr algn="r"/>
             <a:r>
               <a:rPr lang="it-IT" dirty="0"/>
-              <a:t>How to </a:t>
+              <a:t>Clear </a:t>
             </a:r>
             <a:r>
               <a:rPr lang="it-IT" dirty="0" err="1"/>
-              <a:t>get</a:t>
+              <a:t>requirements</a:t>
+            </a:r>
+            <a:endParaRPr lang="it-IT" dirty="0"/>
+          </a:p>
+        </p:txBody>
+      </p:sp>
+      <p:sp>
+        <p:nvSpPr>
+          <p:cNvPr id="6" name="Segnaposto contenuto 2">
+            <a:extLst>
+              <a:ext uri="{FF2B5EF4-FFF2-40B4-BE49-F238E27FC236}">
+                <a16:creationId xmlns:a16="http://schemas.microsoft.com/office/drawing/2014/main" id="{9BB76F55-54A1-AFA5-DFE0-216E6C9E5EFE}"/>
+              </a:ext>
+            </a:extLst>
+          </p:cNvPr>
+          <p:cNvSpPr txBox="1">
+            <a:spLocks/>
+          </p:cNvSpPr>
+          <p:nvPr/>
+        </p:nvSpPr>
+        <p:spPr>
+          <a:xfrm>
+            <a:off x="6172200" y="4152272"/>
+            <a:ext cx="9601200" cy="3581400"/>
+          </a:xfrm>
+          <a:prstGeom prst="rect">
+            <a:avLst/>
+          </a:prstGeom>
+        </p:spPr>
+        <p:txBody>
+          <a:bodyPr vert="horz" lIns="91440" tIns="45720" rIns="91440" bIns="45720" rtlCol="0">
+            <a:normAutofit/>
+          </a:bodyPr>
+          <a:lstStyle>
+            <a:lvl1pPr marL="384048" indent="-384048" algn="l" defTabSz="914400" rtl="0" eaLnBrk="1" latinLnBrk="0" hangingPunct="1">
+              <a:lnSpc>
+                <a:spcPct val="94000"/>
+              </a:lnSpc>
+              <a:spcBef>
+                <a:spcPts val="1000"/>
+              </a:spcBef>
+              <a:spcAft>
+                <a:spcPts val="200"/>
+              </a:spcAft>
+              <a:buFont typeface="Franklin Gothic Book" panose="020B0503020102020204" pitchFamily="34" charset="0"/>
+              <a:buChar char="■"/>
+              <a:defRPr sz="2000" kern="1200" baseline="0">
+                <a:solidFill>
+                  <a:schemeClr val="tx2"/>
+                </a:solidFill>
+                <a:latin typeface="+mn-lt"/>
+                <a:ea typeface="+mn-ea"/>
+                <a:cs typeface="+mn-cs"/>
+              </a:defRPr>
+            </a:lvl1pPr>
+            <a:lvl2pPr marL="914400" indent="-384048" algn="l" defTabSz="914400" rtl="0" eaLnBrk="1" latinLnBrk="0" hangingPunct="1">
+              <a:lnSpc>
+                <a:spcPct val="94000"/>
+              </a:lnSpc>
+              <a:spcBef>
+                <a:spcPts val="500"/>
+              </a:spcBef>
+              <a:spcAft>
+                <a:spcPts val="200"/>
+              </a:spcAft>
+              <a:buFont typeface="Franklin Gothic Book" panose="020B0503020102020204" pitchFamily="34" charset="0"/>
+              <a:buChar char="–"/>
+              <a:defRPr sz="2000" i="1" kern="1200" baseline="0">
+                <a:solidFill>
+                  <a:schemeClr val="tx2"/>
+                </a:solidFill>
+                <a:latin typeface="+mn-lt"/>
+                <a:ea typeface="+mn-ea"/>
+                <a:cs typeface="+mn-cs"/>
+              </a:defRPr>
+            </a:lvl2pPr>
+            <a:lvl3pPr marL="1371600" indent="-384048" algn="l" defTabSz="914400" rtl="0" eaLnBrk="1" latinLnBrk="0" hangingPunct="1">
+              <a:lnSpc>
+                <a:spcPct val="94000"/>
+              </a:lnSpc>
+              <a:spcBef>
+                <a:spcPts val="500"/>
+              </a:spcBef>
+              <a:spcAft>
+                <a:spcPts val="200"/>
+              </a:spcAft>
+              <a:buFont typeface="Franklin Gothic Book" panose="020B0503020102020204" pitchFamily="34" charset="0"/>
+              <a:buChar char="■"/>
+              <a:defRPr sz="1800" kern="1200" baseline="0">
+                <a:solidFill>
+                  <a:schemeClr val="tx2"/>
+                </a:solidFill>
+                <a:latin typeface="+mn-lt"/>
+                <a:ea typeface="+mn-ea"/>
+                <a:cs typeface="+mn-cs"/>
+              </a:defRPr>
+            </a:lvl3pPr>
+            <a:lvl4pPr marL="1828800" indent="-384048" algn="l" defTabSz="914400" rtl="0" eaLnBrk="1" latinLnBrk="0" hangingPunct="1">
+              <a:lnSpc>
+                <a:spcPct val="94000"/>
+              </a:lnSpc>
+              <a:spcBef>
+                <a:spcPts val="500"/>
+              </a:spcBef>
+              <a:spcAft>
+                <a:spcPts val="200"/>
+              </a:spcAft>
+              <a:buFont typeface="Franklin Gothic Book" panose="020B0503020102020204" pitchFamily="34" charset="0"/>
+              <a:buChar char="–"/>
+              <a:defRPr sz="1800" i="1" kern="1200" baseline="0">
+                <a:solidFill>
+                  <a:schemeClr val="tx2"/>
+                </a:solidFill>
+                <a:latin typeface="+mn-lt"/>
+                <a:ea typeface="+mn-ea"/>
+                <a:cs typeface="+mn-cs"/>
+              </a:defRPr>
+            </a:lvl4pPr>
+            <a:lvl5pPr marL="2286000" indent="-384048" algn="l" defTabSz="914400" rtl="0" eaLnBrk="1" latinLnBrk="0" hangingPunct="1">
+              <a:lnSpc>
+                <a:spcPct val="94000"/>
+              </a:lnSpc>
+              <a:spcBef>
+                <a:spcPts val="500"/>
+              </a:spcBef>
+              <a:spcAft>
+                <a:spcPts val="200"/>
+              </a:spcAft>
+              <a:buFont typeface="Franklin Gothic Book" panose="020B0503020102020204" pitchFamily="34" charset="0"/>
+              <a:buChar char="■"/>
+              <a:defRPr sz="1600" kern="1200" baseline="0">
+                <a:solidFill>
+                  <a:schemeClr val="tx2"/>
+                </a:solidFill>
+                <a:latin typeface="+mn-lt"/>
+                <a:ea typeface="+mn-ea"/>
+                <a:cs typeface="+mn-cs"/>
+              </a:defRPr>
+            </a:lvl5pPr>
+            <a:lvl6pPr marL="2743200" indent="-384048" algn="l" defTabSz="914400" rtl="0" eaLnBrk="1" latinLnBrk="0" hangingPunct="1">
+              <a:lnSpc>
+                <a:spcPct val="94000"/>
+              </a:lnSpc>
+              <a:spcBef>
+                <a:spcPts val="500"/>
+              </a:spcBef>
+              <a:spcAft>
+                <a:spcPts val="200"/>
+              </a:spcAft>
+              <a:buFont typeface="Franklin Gothic Book" panose="020B0503020102020204" pitchFamily="34" charset="0"/>
+              <a:buChar char="–"/>
+              <a:defRPr sz="1600" i="1" kern="1200" baseline="0">
+                <a:solidFill>
+                  <a:schemeClr val="tx2"/>
+                </a:solidFill>
+                <a:latin typeface="+mn-lt"/>
+                <a:ea typeface="+mn-ea"/>
+                <a:cs typeface="+mn-cs"/>
+              </a:defRPr>
+            </a:lvl6pPr>
+            <a:lvl7pPr marL="3200400" indent="-384048" algn="l" defTabSz="914400" rtl="0" eaLnBrk="1" latinLnBrk="0" hangingPunct="1">
+              <a:lnSpc>
+                <a:spcPct val="94000"/>
+              </a:lnSpc>
+              <a:spcBef>
+                <a:spcPts val="500"/>
+              </a:spcBef>
+              <a:spcAft>
+                <a:spcPts val="200"/>
+              </a:spcAft>
+              <a:buFont typeface="Franklin Gothic Book" panose="020B0503020102020204" pitchFamily="34" charset="0"/>
+              <a:buChar char="■"/>
+              <a:defRPr sz="1400" kern="1200" baseline="0">
+                <a:solidFill>
+                  <a:schemeClr val="tx2"/>
+                </a:solidFill>
+                <a:latin typeface="+mn-lt"/>
+                <a:ea typeface="+mn-ea"/>
+                <a:cs typeface="+mn-cs"/>
+              </a:defRPr>
+            </a:lvl7pPr>
+            <a:lvl8pPr marL="3657600" indent="-384048" algn="l" defTabSz="914400" rtl="0" eaLnBrk="1" latinLnBrk="0" hangingPunct="1">
+              <a:lnSpc>
+                <a:spcPct val="94000"/>
+              </a:lnSpc>
+              <a:spcBef>
+                <a:spcPts val="500"/>
+              </a:spcBef>
+              <a:spcAft>
+                <a:spcPts val="200"/>
+              </a:spcAft>
+              <a:buFont typeface="Franklin Gothic Book" panose="020B0503020102020204" pitchFamily="34" charset="0"/>
+              <a:buChar char="–"/>
+              <a:defRPr sz="1400" i="1" kern="1200" baseline="0">
+                <a:solidFill>
+                  <a:schemeClr val="tx2"/>
+                </a:solidFill>
+                <a:latin typeface="+mn-lt"/>
+                <a:ea typeface="+mn-ea"/>
+                <a:cs typeface="+mn-cs"/>
+              </a:defRPr>
+            </a:lvl8pPr>
+            <a:lvl9pPr marL="4114800" indent="-384048" algn="l" defTabSz="914400" rtl="0" eaLnBrk="1" latinLnBrk="0" hangingPunct="1">
+              <a:lnSpc>
+                <a:spcPct val="94000"/>
+              </a:lnSpc>
+              <a:spcBef>
+                <a:spcPts val="500"/>
+              </a:spcBef>
+              <a:spcAft>
+                <a:spcPts val="200"/>
+              </a:spcAft>
+              <a:buFont typeface="Franklin Gothic Book" panose="020B0503020102020204" pitchFamily="34" charset="0"/>
+              <a:buChar char="■"/>
+              <a:defRPr sz="1400" kern="1200" baseline="0">
+                <a:solidFill>
+                  <a:schemeClr val="tx2"/>
+                </a:solidFill>
+                <a:latin typeface="+mn-lt"/>
+                <a:ea typeface="+mn-ea"/>
+                <a:cs typeface="+mn-cs"/>
+              </a:defRPr>
+            </a:lvl9pPr>
+          </a:lstStyle>
+          <a:p>
+            <a:r>
+              <a:rPr lang="it-IT" dirty="0" err="1"/>
+              <a:t>Getting</a:t>
             </a:r>
             <a:r>
               <a:rPr lang="it-IT" dirty="0"/>
-              <a:t> data? </a:t>
-            </a:r>
-            <a:r>
-              <a:rPr lang="it-IT" dirty="0" err="1"/>
-              <a:t>Which</a:t>
-            </a:r>
-            <a:r>
-              <a:rPr lang="it-IT" dirty="0"/>
-              <a:t> </a:t>
+              <a:t> data and setting </a:t>
             </a:r>
             <a:r>
               <a:rPr lang="it-IT" dirty="0" err="1"/>
               <a:t>thresholds</a:t>
             </a:r>
+            <a:endParaRPr lang="it-IT" dirty="0"/>
+          </a:p>
+          <a:p>
+            <a:r>
+              <a:rPr lang="it-IT" dirty="0" err="1"/>
+              <a:t>Acting</a:t>
+            </a:r>
             <a:r>
               <a:rPr lang="it-IT" dirty="0"/>
-              <a:t>? </a:t>
-            </a:r>
-          </a:p>
-          <a:p>
-            <a:r>
-              <a:rPr lang="it-IT" dirty="0"/>
-              <a:t>How to </a:t>
+              <a:t> on </a:t>
             </a:r>
             <a:r>
               <a:rPr lang="it-IT" dirty="0" err="1"/>
-              <a:t>communicate</a:t>
-            </a:r>
-            <a:r>
-              <a:rPr lang="it-IT" dirty="0"/>
-              <a:t>?</a:t>
-            </a:r>
-          </a:p>
-          <a:p>
-            <a:r>
-              <a:rPr lang="it-IT" dirty="0"/>
-              <a:t>How to </a:t>
-            </a:r>
+              <a:t>environment</a:t>
+            </a:r>
+            <a:endParaRPr lang="it-IT" dirty="0"/>
+          </a:p>
+          <a:p>
             <a:r>
               <a:rPr lang="it-IT" dirty="0" err="1"/>
-              <a:t>evaluate</a:t>
-            </a:r>
-            <a:r>
-              <a:rPr lang="it-IT" dirty="0"/>
-              <a:t> and act?</a:t>
-            </a:r>
+              <a:t>Communication</a:t>
+            </a:r>
+            <a:endParaRPr lang="it-IT" dirty="0"/>
           </a:p>
           <a:p>
             <a:r>
@@ -4744,6 +5007,7 @@
       <p:bgPr>
         <a:blipFill dpi="0" rotWithShape="1">
           <a:blip r:embed="rId2">
+            <a:alphaModFix amt="65000"/>
             <a:lum/>
           </a:blip>
           <a:srcRect/>
@@ -4891,6 +5155,7 @@
       <p:bgPr>
         <a:blipFill dpi="0" rotWithShape="1">
           <a:blip r:embed="rId2">
+            <a:alphaModFix amt="65000"/>
             <a:lum/>
           </a:blip>
           <a:srcRect/>
@@ -4983,7 +5248,7 @@
           <a:p>
             <a:r>
               <a:rPr lang="it-IT" dirty="0"/>
-              <a:t>ADC sampling, </a:t>
+              <a:t>Sampling: </a:t>
             </a:r>
             <a:r>
               <a:rPr lang="it-IT" dirty="0" err="1"/>
@@ -5022,18 +5287,18 @@
             </a:r>
             <a:r>
               <a:rPr lang="it-IT" dirty="0"/>
-              <a:t> ESP-NOW and custom data </a:t>
+              <a:t> ESP-NOW </a:t>
             </a:r>
             <a:r>
               <a:rPr lang="it-IT" dirty="0" err="1"/>
-              <a:t>structure</a:t>
+              <a:t>protocol</a:t>
             </a:r>
             <a:endParaRPr lang="it-IT" dirty="0"/>
           </a:p>
           <a:p>
             <a:r>
               <a:rPr lang="it-IT" dirty="0"/>
-              <a:t>Data transmission to MQTT broker</a:t>
+              <a:t>Data transmission to a MQTT broker</a:t>
             </a:r>
           </a:p>
           <a:p>
@@ -5043,7 +5308,15 @@
             </a:r>
             <a:r>
               <a:rPr lang="it-IT" dirty="0"/>
-              <a:t> mode for energy </a:t>
+              <a:t> </a:t>
+            </a:r>
+            <a:r>
+              <a:rPr lang="it-IT" dirty="0" err="1"/>
+              <a:t>modes</a:t>
+            </a:r>
+            <a:r>
+              <a:rPr lang="it-IT" dirty="0"/>
+              <a:t> for energy </a:t>
             </a:r>
             <a:r>
               <a:rPr lang="it-IT" dirty="0" err="1"/>
@@ -5073,6 +5346,7 @@
       <p:bgPr>
         <a:blipFill dpi="0" rotWithShape="1">
           <a:blip r:embed="rId2">
+            <a:alphaModFix amt="65000"/>
             <a:lum/>
           </a:blip>
           <a:srcRect/>
@@ -5226,7 +5500,13 @@
             </a:r>
             <a:r>
               <a:rPr lang="it-IT" dirty="0"/>
-              <a:t> and energy </a:t>
+              <a:t> </a:t>
+            </a:r>
+          </a:p>
+          <a:p>
+            <a:r>
+              <a:rPr lang="it-IT" dirty="0"/>
+              <a:t>Energy </a:t>
             </a:r>
             <a:r>
               <a:rPr lang="it-IT" dirty="0" err="1"/>
@@ -5256,6 +5536,7 @@
       <p:bgPr>
         <a:blipFill dpi="0" rotWithShape="1">
           <a:blip r:embed="rId2">
+            <a:alphaModFix amt="65000"/>
             <a:lum/>
           </a:blip>
           <a:srcRect/>
@@ -5399,6 +5680,7 @@
       <p:bgPr>
         <a:blipFill dpi="0" rotWithShape="1">
           <a:blip r:embed="rId2">
+            <a:alphaModFix amt="65000"/>
             <a:lum/>
           </a:blip>
           <a:srcRect/>
@@ -5483,24 +5765,67 @@
           </a:xfrm>
         </p:spPr>
         <p:txBody>
-          <a:bodyPr/>
+          <a:bodyPr>
+            <a:normAutofit lnSpcReduction="10000"/>
+          </a:bodyPr>
           <a:lstStyle/>
           <a:p>
             <a:r>
               <a:rPr lang="it-IT" dirty="0"/>
-              <a:t>Air </a:t>
+              <a:t>Development </a:t>
             </a:r>
             <a:r>
               <a:rPr lang="it-IT" dirty="0" err="1"/>
-              <a:t>quality</a:t>
+              <a:t>problems</a:t>
             </a:r>
             <a:r>
               <a:rPr lang="it-IT" dirty="0"/>
-              <a:t> -&gt; </a:t>
-            </a:r>
+              <a:t>:</a:t>
+            </a:r>
+          </a:p>
+          <a:p>
+            <a:pPr lvl="1"/>
             <a:r>
               <a:rPr lang="it-IT" dirty="0" err="1"/>
-              <a:t>almost</a:t>
+              <a:t>Microphone</a:t>
+            </a:r>
+            <a:r>
+              <a:rPr lang="it-IT" dirty="0"/>
+              <a:t>, </a:t>
+            </a:r>
+            <a:r>
+              <a:rPr lang="it-IT" dirty="0" err="1"/>
+              <a:t>analog</a:t>
+            </a:r>
+            <a:r>
+              <a:rPr lang="it-IT" dirty="0"/>
+              <a:t> or </a:t>
+            </a:r>
+            <a:r>
+              <a:rPr lang="it-IT" dirty="0" err="1"/>
+              <a:t>digital</a:t>
+            </a:r>
+            <a:endParaRPr lang="it-IT" dirty="0"/>
+          </a:p>
+          <a:p>
+            <a:pPr lvl="1"/>
+            <a:r>
+              <a:rPr lang="it-IT" dirty="0"/>
+              <a:t>ESP-NOW </a:t>
+            </a:r>
+            <a:r>
+              <a:rPr lang="it-IT" dirty="0" err="1"/>
+              <a:t>wake</a:t>
+            </a:r>
+            <a:r>
+              <a:rPr lang="it-IT" dirty="0"/>
+              <a:t> up</a:t>
+            </a:r>
+          </a:p>
+          <a:p>
+            <a:r>
+              <a:rPr lang="it-IT" dirty="0" err="1"/>
+              <a:t>Measurment</a:t>
             </a:r>
             <a:r>
               <a:rPr lang="it-IT" dirty="0"/>
@@ -5508,14 +5833,24 @@
             </a:r>
             <a:r>
               <a:rPr lang="it-IT" dirty="0" err="1"/>
-              <a:t>done</a:t>
-            </a:r>
-            <a:endParaRPr lang="it-IT" dirty="0"/>
+              <a:t>problem</a:t>
+            </a:r>
+            <a:r>
+              <a:rPr lang="it-IT" dirty="0"/>
+              <a:t>:</a:t>
+            </a:r>
+          </a:p>
+          <a:p>
+            <a:pPr lvl="1"/>
+            <a:r>
+              <a:rPr lang="it-IT" dirty="0"/>
+              <a:t>Good places for sampling</a:t>
+            </a:r>
           </a:p>
           <a:p>
             <a:r>
               <a:rPr lang="it-IT" dirty="0" err="1"/>
-              <a:t>Noise</a:t>
+              <a:t>Acting</a:t>
             </a:r>
             <a:r>
               <a:rPr lang="it-IT" dirty="0"/>
@@ -5523,97 +5858,24 @@
             </a:r>
             <a:r>
               <a:rPr lang="it-IT" dirty="0" err="1"/>
-              <a:t>dection</a:t>
+              <a:t>problem</a:t>
             </a:r>
             <a:r>
               <a:rPr lang="it-IT" dirty="0"/>
-              <a:t> -&gt; on the way to solve </a:t>
+              <a:t>:</a:t>
+            </a:r>
+          </a:p>
+          <a:p>
+            <a:pPr lvl="1"/>
+            <a:r>
+              <a:rPr lang="it-IT" dirty="0"/>
+              <a:t>Setting up the </a:t>
             </a:r>
             <a:r>
               <a:rPr lang="it-IT" dirty="0" err="1"/>
-              <a:t>it</a:t>
-            </a:r>
-            <a:r>
-              <a:rPr lang="it-IT" dirty="0"/>
-              <a:t> </a:t>
-            </a:r>
-            <a:r>
-              <a:rPr lang="it-IT" dirty="0" err="1"/>
-              <a:t>using</a:t>
-            </a:r>
-            <a:r>
-              <a:rPr lang="it-IT" dirty="0"/>
-              <a:t> </a:t>
-            </a:r>
-            <a:r>
-              <a:rPr lang="it-IT" dirty="0" err="1"/>
-              <a:t>digital</a:t>
-            </a:r>
-            <a:r>
-              <a:rPr lang="it-IT" dirty="0"/>
-              <a:t> output</a:t>
-            </a:r>
-          </a:p>
-          <a:p>
-            <a:r>
-              <a:rPr lang="it-IT" dirty="0" err="1"/>
-              <a:t>Nodes</a:t>
-            </a:r>
-            <a:r>
-              <a:rPr lang="it-IT" dirty="0"/>
-              <a:t> </a:t>
-            </a:r>
-            <a:r>
-              <a:rPr lang="it-IT" dirty="0" err="1"/>
-              <a:t>tx</a:t>
-            </a:r>
-            <a:r>
-              <a:rPr lang="it-IT" dirty="0"/>
-              <a:t>/rx  -&gt; </a:t>
-            </a:r>
-            <a:r>
-              <a:rPr lang="it-IT" dirty="0" err="1"/>
-              <a:t>done</a:t>
-            </a:r>
-            <a:r>
-              <a:rPr lang="it-IT" dirty="0"/>
-              <a:t> </a:t>
-            </a:r>
-            <a:r>
-              <a:rPr lang="it-IT" dirty="0" err="1"/>
-              <a:t>using</a:t>
-            </a:r>
-            <a:r>
-              <a:rPr lang="it-IT" dirty="0"/>
-              <a:t> esp </a:t>
-            </a:r>
-            <a:r>
-              <a:rPr lang="it-IT" dirty="0" err="1"/>
-              <a:t>now</a:t>
+              <a:t>actuators</a:t>
             </a:r>
             <a:endParaRPr lang="it-IT" dirty="0"/>
-          </a:p>
-          <a:p>
-            <a:r>
-              <a:rPr lang="it-IT" dirty="0"/>
-              <a:t>Wake up/ </a:t>
-            </a:r>
-            <a:r>
-              <a:rPr lang="it-IT" dirty="0" err="1"/>
-              <a:t>sleep</a:t>
-            </a:r>
-            <a:r>
-              <a:rPr lang="it-IT" dirty="0"/>
-              <a:t> mode -&gt; esp </a:t>
-            </a:r>
-            <a:r>
-              <a:rPr lang="it-IT" dirty="0" err="1"/>
-              <a:t>now</a:t>
-            </a:r>
-            <a:r>
-              <a:rPr lang="it-IT" dirty="0"/>
-              <a:t> and timers</a:t>
-            </a:r>
           </a:p>
         </p:txBody>
       </p:sp>
@@ -5621,6 +5883,98 @@
     <p:extLst>
       <p:ext uri="{BB962C8B-B14F-4D97-AF65-F5344CB8AC3E}">
         <p14:creationId xmlns:p14="http://schemas.microsoft.com/office/powerpoint/2010/main" val="1398389979"/>
+      </p:ext>
+    </p:extLst>
+  </p:cSld>
+  <p:clrMapOvr>
+    <a:masterClrMapping/>
+  </p:clrMapOvr>
+</p:sld>
+</file>
+
+<file path=ppt/slides/slide8.xml><?xml version="1.0" encoding="utf-8"?>
+<p:sld xmlns:a="http://schemas.openxmlformats.org/drawingml/2006/main" xmlns:r="http://schemas.openxmlformats.org/officeDocument/2006/relationships" xmlns:p="http://schemas.openxmlformats.org/presentationml/2006/main">
+  <p:cSld>
+    <p:bg>
+      <p:bgPr>
+        <a:blipFill dpi="0" rotWithShape="1">
+          <a:blip r:embed="rId2">
+            <a:alphaModFix amt="65000"/>
+            <a:lum/>
+          </a:blip>
+          <a:srcRect/>
+          <a:stretch>
+            <a:fillRect l="-1000" r="-1000"/>
+          </a:stretch>
+        </a:blipFill>
+        <a:effectLst/>
+      </p:bgPr>
+    </p:bg>
+    <p:spTree>
+      <p:nvGrpSpPr>
+        <p:cNvPr id="1" name=""/>
+        <p:cNvGrpSpPr/>
+        <p:nvPr/>
+      </p:nvGrpSpPr>
+      <p:grpSpPr>
+        <a:xfrm>
+          <a:off x="0" y="0"/>
+          <a:ext cx="0" cy="0"/>
+          <a:chOff x="0" y="0"/>
+          <a:chExt cx="0" cy="0"/>
+        </a:xfrm>
+      </p:grpSpPr>
+      <p:sp>
+        <p:nvSpPr>
+          <p:cNvPr id="2" name="Titolo 1">
+            <a:extLst>
+              <a:ext uri="{FF2B5EF4-FFF2-40B4-BE49-F238E27FC236}">
+                <a16:creationId xmlns:a16="http://schemas.microsoft.com/office/drawing/2014/main" id="{C202C44E-4310-7A5E-C32B-7D5573232609}"/>
+              </a:ext>
+            </a:extLst>
+          </p:cNvPr>
+          <p:cNvSpPr>
+            <a:spLocks noGrp="1"/>
+          </p:cNvSpPr>
+          <p:nvPr>
+            <p:ph type="title"/>
+          </p:nvPr>
+        </p:nvSpPr>
+        <p:spPr>
+          <a:xfrm>
+            <a:off x="1295400" y="2686050"/>
+            <a:ext cx="9601200" cy="1485900"/>
+          </a:xfrm>
+        </p:spPr>
+        <p:txBody>
+          <a:bodyPr/>
+          <a:lstStyle/>
+          <a:p>
+            <a:pPr algn="ctr"/>
+            <a:r>
+              <a:rPr lang="it-IT" dirty="0"/>
+              <a:t>Thanks for </a:t>
+            </a:r>
+            <a:r>
+              <a:rPr lang="it-IT" dirty="0" err="1"/>
+              <a:t>your</a:t>
+            </a:r>
+            <a:r>
+              <a:rPr lang="it-IT" dirty="0"/>
+              <a:t> </a:t>
+            </a:r>
+            <a:r>
+              <a:rPr lang="it-IT" dirty="0" err="1"/>
+              <a:t>attention</a:t>
+            </a:r>
+            <a:endParaRPr lang="it-IT" dirty="0"/>
+          </a:p>
+        </p:txBody>
+      </p:sp>
+    </p:spTree>
+    <p:extLst>
+      <p:ext uri="{BB962C8B-B14F-4D97-AF65-F5344CB8AC3E}">
+        <p14:creationId xmlns:p14="http://schemas.microsoft.com/office/powerpoint/2010/main" val="982040762"/>
       </p:ext>
     </p:extLst>
   </p:cSld>

</xml_diff>

<commit_message>
Final version of mid term presentation
</commit_message>
<xml_diff>
--- a/presentation/intermediate_pres.pptx
+++ b/presentation/intermediate_pres.pptx
@@ -204,7 +204,7 @@
           <a:p>
             <a:fld id="{B59532E3-6C5C-4727-A1E2-C1325B6F8B19}" type="datetimeFigureOut">
               <a:rPr lang="it-IT" smtClean="0"/>
-              <a:t>30/05/2024</a:t>
+              <a:t>31/05/2024</a:t>
             </a:fld>
             <a:endParaRPr lang="it-IT"/>
           </a:p>
@@ -724,7 +724,7 @@
           <a:p>
             <a:fld id="{F7610621-398E-4E40-9D6B-5068DC0E40D1}" type="datetimeFigureOut">
               <a:rPr lang="it-IT" smtClean="0"/>
-              <a:t>30/05/2024</a:t>
+              <a:t>31/05/2024</a:t>
             </a:fld>
             <a:endParaRPr lang="it-IT"/>
           </a:p>
@@ -1054,7 +1054,7 @@
           <a:p>
             <a:fld id="{F7610621-398E-4E40-9D6B-5068DC0E40D1}" type="datetimeFigureOut">
               <a:rPr lang="it-IT" smtClean="0"/>
-              <a:t>30/05/2024</a:t>
+              <a:t>31/05/2024</a:t>
             </a:fld>
             <a:endParaRPr lang="it-IT"/>
           </a:p>
@@ -1234,7 +1234,7 @@
           <a:p>
             <a:fld id="{F7610621-398E-4E40-9D6B-5068DC0E40D1}" type="datetimeFigureOut">
               <a:rPr lang="it-IT" smtClean="0"/>
-              <a:t>30/05/2024</a:t>
+              <a:t>31/05/2024</a:t>
             </a:fld>
             <a:endParaRPr lang="it-IT"/>
           </a:p>
@@ -1404,7 +1404,7 @@
           <a:p>
             <a:fld id="{F7610621-398E-4E40-9D6B-5068DC0E40D1}" type="datetimeFigureOut">
               <a:rPr lang="it-IT" smtClean="0"/>
-              <a:t>30/05/2024</a:t>
+              <a:t>31/05/2024</a:t>
             </a:fld>
             <a:endParaRPr lang="it-IT"/>
           </a:p>
@@ -1681,7 +1681,7 @@
           <a:p>
             <a:fld id="{F7610621-398E-4E40-9D6B-5068DC0E40D1}" type="datetimeFigureOut">
               <a:rPr lang="it-IT" smtClean="0"/>
-              <a:t>30/05/2024</a:t>
+              <a:t>31/05/2024</a:t>
             </a:fld>
             <a:endParaRPr lang="it-IT"/>
           </a:p>
@@ -2075,7 +2075,7 @@
           <a:p>
             <a:fld id="{F7610621-398E-4E40-9D6B-5068DC0E40D1}" type="datetimeFigureOut">
               <a:rPr lang="it-IT" smtClean="0"/>
-              <a:t>30/05/2024</a:t>
+              <a:t>31/05/2024</a:t>
             </a:fld>
             <a:endParaRPr lang="it-IT"/>
           </a:p>
@@ -2552,7 +2552,7 @@
           <a:p>
             <a:fld id="{F7610621-398E-4E40-9D6B-5068DC0E40D1}" type="datetimeFigureOut">
               <a:rPr lang="it-IT" smtClean="0"/>
-              <a:t>30/05/2024</a:t>
+              <a:t>31/05/2024</a:t>
             </a:fld>
             <a:endParaRPr lang="it-IT"/>
           </a:p>
@@ -2670,7 +2670,7 @@
           <a:p>
             <a:fld id="{F7610621-398E-4E40-9D6B-5068DC0E40D1}" type="datetimeFigureOut">
               <a:rPr lang="it-IT" smtClean="0"/>
-              <a:t>30/05/2024</a:t>
+              <a:t>31/05/2024</a:t>
             </a:fld>
             <a:endParaRPr lang="it-IT"/>
           </a:p>
@@ -2765,7 +2765,7 @@
           <a:p>
             <a:fld id="{F7610621-398E-4E40-9D6B-5068DC0E40D1}" type="datetimeFigureOut">
               <a:rPr lang="it-IT" smtClean="0"/>
-              <a:t>30/05/2024</a:t>
+              <a:t>31/05/2024</a:t>
             </a:fld>
             <a:endParaRPr lang="it-IT"/>
           </a:p>
@@ -3111,7 +3111,7 @@
           <a:p>
             <a:fld id="{F7610621-398E-4E40-9D6B-5068DC0E40D1}" type="datetimeFigureOut">
               <a:rPr lang="it-IT" smtClean="0"/>
-              <a:t>30/05/2024</a:t>
+              <a:t>31/05/2024</a:t>
             </a:fld>
             <a:endParaRPr lang="it-IT"/>
           </a:p>
@@ -3499,7 +3499,7 @@
           <a:p>
             <a:fld id="{F7610621-398E-4E40-9D6B-5068DC0E40D1}" type="datetimeFigureOut">
               <a:rPr lang="it-IT" smtClean="0"/>
-              <a:t>30/05/2024</a:t>
+              <a:t>31/05/2024</a:t>
             </a:fld>
             <a:endParaRPr lang="it-IT"/>
           </a:p>
@@ -3777,7 +3777,7 @@
           <a:p>
             <a:fld id="{F7610621-398E-4E40-9D6B-5068DC0E40D1}" type="datetimeFigureOut">
               <a:rPr lang="it-IT" smtClean="0"/>
-              <a:t>30/05/2024</a:t>
+              <a:t>31/05/2024</a:t>
             </a:fld>
             <a:endParaRPr lang="it-IT"/>
           </a:p>
@@ -4466,13 +4466,13 @@
   <p:clrMapOvr>
     <a:overrideClrMapping bg1="dk1" tx1="lt1" bg2="dk2" tx2="lt2" accent1="accent1" accent2="accent2" accent3="accent3" accent4="accent4" accent5="accent5" accent6="accent6" hlink="hlink" folHlink="folHlink"/>
   </p:clrMapOvr>
-  <mc:AlternateContent xmlns:mc="http://schemas.openxmlformats.org/markup-compatibility/2006">
-    <mc:Choice xmlns:p159="http://schemas.microsoft.com/office/powerpoint/2015/09/main" Requires="p159">
+  <mc:AlternateContent xmlns:mc="http://schemas.openxmlformats.org/markup-compatibility/2006" xmlns:p159="http://schemas.microsoft.com/office/powerpoint/2015/09/main">
+    <mc:Choice Requires="p159">
       <p:transition xmlns:p14="http://schemas.microsoft.com/office/powerpoint/2010/main" spd="slow" p14:dur="2000">
         <p159:morph option="byObject"/>
       </p:transition>
     </mc:Choice>
-    <mc:Fallback>
+    <mc:Fallback xmlns="">
       <p:transition spd="slow">
         <p:fade/>
       </p:transition>
@@ -5498,13 +5498,13 @@
   <p:clrMapOvr>
     <a:masterClrMapping/>
   </p:clrMapOvr>
-  <mc:AlternateContent xmlns:mc="http://schemas.openxmlformats.org/markup-compatibility/2006">
-    <mc:Choice xmlns:p159="http://schemas.microsoft.com/office/powerpoint/2015/09/main" Requires="p159">
+  <mc:AlternateContent xmlns:mc="http://schemas.openxmlformats.org/markup-compatibility/2006" xmlns:p159="http://schemas.microsoft.com/office/powerpoint/2015/09/main">
+    <mc:Choice Requires="p159">
       <p:transition xmlns:p14="http://schemas.microsoft.com/office/powerpoint/2010/main" spd="slow" p14:dur="2000">
         <p159:morph option="byObject"/>
       </p:transition>
     </mc:Choice>
-    <mc:Fallback>
+    <mc:Fallback xmlns="">
       <p:transition spd="slow">
         <p:fade/>
       </p:transition>
@@ -10698,7 +10698,7 @@
         </p:nvSpPr>
         <p:spPr>
           <a:xfrm>
-            <a:off x="1451579" y="1853754"/>
+            <a:off x="1451579" y="2119226"/>
             <a:ext cx="9492916" cy="2666164"/>
           </a:xfrm>
         </p:spPr>
@@ -10715,15 +10715,7 @@
             </a:pPr>
             <a:r>
               <a:rPr lang="it-IT" dirty="0"/>
-              <a:t>Development </a:t>
-            </a:r>
-            <a:r>
-              <a:rPr lang="it-IT" dirty="0" err="1"/>
-              <a:t>problems</a:t>
-            </a:r>
-            <a:r>
-              <a:rPr lang="it-IT" dirty="0"/>
-              <a:t>:</a:t>
+              <a:t>Development:</a:t>
             </a:r>
           </a:p>
           <a:p>
@@ -10785,14 +10777,6 @@
             </a:r>
             <a:r>
               <a:rPr lang="it-IT" dirty="0"/>
-              <a:t> </a:t>
-            </a:r>
-            <a:r>
-              <a:rPr lang="it-IT" dirty="0" err="1"/>
-              <a:t>problem</a:t>
-            </a:r>
-            <a:r>
-              <a:rPr lang="it-IT" dirty="0"/>
               <a:t>:</a:t>
             </a:r>
           </a:p>
@@ -10816,14 +10800,6 @@
             <a:r>
               <a:rPr lang="it-IT" dirty="0" err="1"/>
               <a:t>Acting</a:t>
-            </a:r>
-            <a:r>
-              <a:rPr lang="it-IT" dirty="0"/>
-              <a:t> </a:t>
-            </a:r>
-            <a:r>
-              <a:rPr lang="it-IT" dirty="0" err="1"/>
-              <a:t>problem</a:t>
             </a:r>
             <a:r>
               <a:rPr lang="it-IT" dirty="0"/>

</xml_diff>